<commit_message>
More fixes via Lizhou
</commit_message>
<xml_diff>
--- a/tcqf-slides.pptx
+++ b/tcqf-slides.pptx
@@ -10997,7 +10997,7 @@
         </p:spPr>
         <p:txBody>
           <a:bodyPr vertOverflow="overflow" horzOverflow="overflow" vert="horz" wrap="square" lIns="91440" tIns="45720" rIns="91440" bIns="45720" numCol="1" spcCol="0" rtlCol="0" fromWordArt="0" anchor="t" anchorCtr="0" forceAA="0" upright="0" compatLnSpc="0">
-            <a:normAutofit fontScale="80000" lnSpcReduction="4000"/>
+            <a:normAutofit fontScale="70000" lnSpcReduction="6000"/>
           </a:bodyPr>
           <a:lstStyle/>
           <a:p>
@@ -11056,7 +11056,7 @@
             </a:pPr>
             <a:r>
               <a:rPr/>
-              <a:t>Differences in link propagation latency</a:t>
+              <a:t>Differences in link/media propagation latency</a:t>
             </a:r>
             <a:endParaRPr/>
           </a:p>
@@ -11081,32 +11081,12 @@
             <a:endParaRPr/>
           </a:p>
           <a:p>
-            <a:pPr lvl="1">
+            <a:pPr lvl="0">
               <a:defRPr/>
             </a:pPr>
             <a:r>
               <a:rPr/>
-              <a:t>FEC / ARQ introduced variation (8 msec in DSL FEC – bad example, low-speed)</a:t>
-            </a:r>
-            <a:endParaRPr/>
-          </a:p>
-          <a:p>
-            <a:pPr lvl="1">
-              <a:defRPr/>
-            </a:pPr>
-            <a:r>
-              <a:rPr/>
-              <a:t>WiFi / Radio links – FEC / ARQ / interference / reflections / ... ? (TBD)</a:t>
-            </a:r>
-            <a:endParaRPr/>
-          </a:p>
-          <a:p>
-            <a:pPr lvl="0">
-              <a:defRPr/>
-            </a:pPr>
-            <a:r>
-              <a:rPr/>
-              <a:t>Differences in in-node processing latencies</a:t>
+              <a:t>Differences in processing latencies</a:t>
             </a:r>
             <a:endParaRPr/>
           </a:p>
@@ -11125,8 +11105,52 @@
               <a:defRPr/>
             </a:pPr>
             <a:r>
+              <a:rPr lang="en-US" sz="2400" b="0" i="0" u="none" strike="noStrike" cap="none" spc="0">
+                <a:solidFill>
+                  <a:schemeClr val="tx1"/>
+                </a:solidFill>
+                <a:latin typeface="+mn-lt"/>
+                <a:ea typeface="+mn-ea"/>
+                <a:cs typeface="+mn-cs"/>
+              </a:rPr>
+              <a:t>FEC / ARQ introduced variation (8 msec in DSL FEC – bad example, low-speed)</a:t>
+            </a:r>
+            <a:endParaRPr sz="2400"/>
+          </a:p>
+          <a:p>
+            <a:pPr lvl="1">
+              <a:defRPr/>
+            </a:pPr>
+            <a:r>
+              <a:rPr lang="en-US" sz="2400" b="0" i="0" u="none" strike="noStrike" cap="none" spc="0">
+                <a:solidFill>
+                  <a:schemeClr val="tx1"/>
+                </a:solidFill>
+                <a:latin typeface="+mn-lt"/>
+                <a:ea typeface="+mn-ea"/>
+                <a:cs typeface="+mn-cs"/>
+              </a:rPr>
+              <a:t>WiFi / Radio links – FEC / ARQ / interference / reflections / ... ? (TBD)</a:t>
+            </a:r>
+            <a:endParaRPr sz="2400"/>
+          </a:p>
+          <a:p>
+            <a:pPr lvl="1">
+              <a:defRPr/>
+            </a:pPr>
+            <a:r>
               <a:rPr/>
-              <a:t>But maybe relevant when we look into high-speed software forwarders (TBD)</a:t>
+              <a:t>High-speed , complex forwarder , software forwarders</a:t>
+            </a:r>
+            <a:endParaRPr/>
+          </a:p>
+          <a:p>
+            <a:pPr lvl="1">
+              <a:defRPr/>
+            </a:pPr>
+            <a:r>
+              <a:rPr/>
+              <a:t>Buffering out variations in all these cases at lower processing layer could be more complex than solving variations through TCQF</a:t>
             </a:r>
             <a:endParaRPr/>
           </a:p>

</xml_diff>